<commit_message>
Updated PowerPoint and Visio files with latest changes
</commit_message>
<xml_diff>
--- a/Roadmap Masterarbeit.pptx
+++ b/Roadmap Masterarbeit.pptx
@@ -6,8 +6,11 @@
   </p:sldMasterIdLst>
   <p:sldIdLst>
     <p:sldId id="256" r:id="rId2"/>
-    <p:sldId id="257" r:id="rId3"/>
-    <p:sldId id="258" r:id="rId4"/>
+    <p:sldId id="259" r:id="rId3"/>
+    <p:sldId id="262" r:id="rId4"/>
+    <p:sldId id="257" r:id="rId5"/>
+    <p:sldId id="258" r:id="rId6"/>
+    <p:sldId id="261" r:id="rId7"/>
   </p:sldIdLst>
   <p:sldSz cx="12192000" cy="6858000"/>
   <p:notesSz cx="6858000" cy="9144000"/>
@@ -106,6 +109,29 @@
       </a:defRPr>
     </a:lvl9pPr>
   </p:defaultTextStyle>
+  <p:extLst>
+    <p:ext uri="{521415D9-36F7-43E2-AB2F-B90AF26B5E84}">
+      <p14:sectionLst xmlns:p14="http://schemas.microsoft.com/office/powerpoint/2010/main">
+        <p14:section name="Standardabschnitt" id="{F4F92491-AE60-4817-8CE9-BB2C927A11D5}">
+          <p14:sldIdLst>
+            <p14:sldId id="256"/>
+          </p14:sldIdLst>
+        </p14:section>
+        <p14:section name="Abschnitt ohne Titel" id="{7EBD3A8B-FF3E-4EB6-AC27-9F8637707A5D}">
+          <p14:sldIdLst>
+            <p14:sldId id="259"/>
+            <p14:sldId id="262"/>
+            <p14:sldId id="257"/>
+            <p14:sldId id="258"/>
+            <p14:sldId id="261"/>
+          </p14:sldIdLst>
+        </p14:section>
+      </p14:sectionLst>
+    </p:ext>
+    <p:ext uri="{EFAFB233-063F-42B5-8137-9DF3F51BA10A}">
+      <p15:sldGuideLst xmlns:p15="http://schemas.microsoft.com/office/powerpoint/2012/main"/>
+    </p:ext>
+  </p:extLst>
 </p:presentation>
 </file>
 
@@ -256,7 +282,7 @@
           <a:p>
             <a:fld id="{DAF72321-0ADC-40FD-88D2-B46DBDBC0FBC}" type="datetimeFigureOut">
               <a:rPr lang="de-DE" smtClean="0"/>
-              <a:t>01.09.2025</a:t>
+              <a:t>02.09.2025</a:t>
             </a:fld>
             <a:endParaRPr lang="de-DE"/>
           </a:p>
@@ -454,7 +480,7 @@
           <a:p>
             <a:fld id="{DAF72321-0ADC-40FD-88D2-B46DBDBC0FBC}" type="datetimeFigureOut">
               <a:rPr lang="de-DE" smtClean="0"/>
-              <a:t>01.09.2025</a:t>
+              <a:t>02.09.2025</a:t>
             </a:fld>
             <a:endParaRPr lang="de-DE"/>
           </a:p>
@@ -662,7 +688,7 @@
           <a:p>
             <a:fld id="{DAF72321-0ADC-40FD-88D2-B46DBDBC0FBC}" type="datetimeFigureOut">
               <a:rPr lang="de-DE" smtClean="0"/>
-              <a:t>01.09.2025</a:t>
+              <a:t>02.09.2025</a:t>
             </a:fld>
             <a:endParaRPr lang="de-DE"/>
           </a:p>
@@ -860,7 +886,7 @@
           <a:p>
             <a:fld id="{DAF72321-0ADC-40FD-88D2-B46DBDBC0FBC}" type="datetimeFigureOut">
               <a:rPr lang="de-DE" smtClean="0"/>
-              <a:t>01.09.2025</a:t>
+              <a:t>02.09.2025</a:t>
             </a:fld>
             <a:endParaRPr lang="de-DE"/>
           </a:p>
@@ -1135,7 +1161,7 @@
           <a:p>
             <a:fld id="{DAF72321-0ADC-40FD-88D2-B46DBDBC0FBC}" type="datetimeFigureOut">
               <a:rPr lang="de-DE" smtClean="0"/>
-              <a:t>01.09.2025</a:t>
+              <a:t>02.09.2025</a:t>
             </a:fld>
             <a:endParaRPr lang="de-DE"/>
           </a:p>
@@ -1400,7 +1426,7 @@
           <a:p>
             <a:fld id="{DAF72321-0ADC-40FD-88D2-B46DBDBC0FBC}" type="datetimeFigureOut">
               <a:rPr lang="de-DE" smtClean="0"/>
-              <a:t>01.09.2025</a:t>
+              <a:t>02.09.2025</a:t>
             </a:fld>
             <a:endParaRPr lang="de-DE"/>
           </a:p>
@@ -1812,7 +1838,7 @@
           <a:p>
             <a:fld id="{DAF72321-0ADC-40FD-88D2-B46DBDBC0FBC}" type="datetimeFigureOut">
               <a:rPr lang="de-DE" smtClean="0"/>
-              <a:t>01.09.2025</a:t>
+              <a:t>02.09.2025</a:t>
             </a:fld>
             <a:endParaRPr lang="de-DE"/>
           </a:p>
@@ -1953,7 +1979,7 @@
           <a:p>
             <a:fld id="{DAF72321-0ADC-40FD-88D2-B46DBDBC0FBC}" type="datetimeFigureOut">
               <a:rPr lang="de-DE" smtClean="0"/>
-              <a:t>01.09.2025</a:t>
+              <a:t>02.09.2025</a:t>
             </a:fld>
             <a:endParaRPr lang="de-DE"/>
           </a:p>
@@ -2066,7 +2092,7 @@
           <a:p>
             <a:fld id="{DAF72321-0ADC-40FD-88D2-B46DBDBC0FBC}" type="datetimeFigureOut">
               <a:rPr lang="de-DE" smtClean="0"/>
-              <a:t>01.09.2025</a:t>
+              <a:t>02.09.2025</a:t>
             </a:fld>
             <a:endParaRPr lang="de-DE"/>
           </a:p>
@@ -2377,7 +2403,7 @@
           <a:p>
             <a:fld id="{DAF72321-0ADC-40FD-88D2-B46DBDBC0FBC}" type="datetimeFigureOut">
               <a:rPr lang="de-DE" smtClean="0"/>
-              <a:t>01.09.2025</a:t>
+              <a:t>02.09.2025</a:t>
             </a:fld>
             <a:endParaRPr lang="de-DE"/>
           </a:p>
@@ -2665,7 +2691,7 @@
           <a:p>
             <a:fld id="{DAF72321-0ADC-40FD-88D2-B46DBDBC0FBC}" type="datetimeFigureOut">
               <a:rPr lang="de-DE" smtClean="0"/>
-              <a:t>01.09.2025</a:t>
+              <a:t>02.09.2025</a:t>
             </a:fld>
             <a:endParaRPr lang="de-DE"/>
           </a:p>
@@ -2906,7 +2932,7 @@
           <a:p>
             <a:fld id="{DAF72321-0ADC-40FD-88D2-B46DBDBC0FBC}" type="datetimeFigureOut">
               <a:rPr lang="de-DE" smtClean="0"/>
-              <a:t>01.09.2025</a:t>
+              <a:t>02.09.2025</a:t>
             </a:fld>
             <a:endParaRPr lang="de-DE"/>
           </a:p>
@@ -3394,7 +3420,7 @@
           <a:p>
             <a:r>
               <a:rPr lang="de-DE" dirty="0"/>
-              <a:t>Roadmap Masterarbeit</a:t>
+              <a:t>Kick-Off Masterarbeit</a:t>
             </a:r>
           </a:p>
         </p:txBody>
@@ -3421,10 +3447,9 @@
           <a:lstStyle/>
           <a:p>
             <a:r>
-              <a:rPr lang="de-DE" dirty="0" err="1"/>
-              <a:t>Jahresverschattung</a:t>
-            </a:r>
-            <a:endParaRPr lang="de-DE" dirty="0"/>
+              <a:rPr lang="de-DE" dirty="0"/>
+              <a:t>Jahresverschattungstool</a:t>
+            </a:r>
           </a:p>
         </p:txBody>
       </p:sp>
@@ -3463,7 +3488,7 @@
           <p:cNvPr id="2" name="Titel 1">
             <a:extLst>
               <a:ext uri="{FF2B5EF4-FFF2-40B4-BE49-F238E27FC236}">
-                <a16:creationId xmlns:a16="http://schemas.microsoft.com/office/drawing/2014/main" id="{E5B5B2EA-BBE3-142A-D1EA-FCABF2DE8499}"/>
+                <a16:creationId xmlns:a16="http://schemas.microsoft.com/office/drawing/2014/main" id="{976214FD-4F20-574A-974F-C353335955AE}"/>
               </a:ext>
             </a:extLst>
           </p:cNvPr>
@@ -3479,7 +3504,10 @@
           <a:bodyPr/>
           <a:lstStyle/>
           <a:p>
-            <a:endParaRPr lang="de-DE"/>
+            <a:r>
+              <a:rPr lang="de-DE" dirty="0"/>
+              <a:t>Roadmap</a:t>
+            </a:r>
           </a:p>
         </p:txBody>
       </p:sp>
@@ -3488,7 +3516,7 @@
           <p:cNvPr id="3" name="Inhaltsplatzhalter 2">
             <a:extLst>
               <a:ext uri="{FF2B5EF4-FFF2-40B4-BE49-F238E27FC236}">
-                <a16:creationId xmlns:a16="http://schemas.microsoft.com/office/drawing/2014/main" id="{43A4864D-EC40-06B1-BFC7-2E6918226981}"/>
+                <a16:creationId xmlns:a16="http://schemas.microsoft.com/office/drawing/2014/main" id="{BB964B09-E24F-0130-3DB3-8BB22E2585C7}"/>
               </a:ext>
             </a:extLst>
           </p:cNvPr>
@@ -3501,47 +3529,162 @@
         </p:nvSpPr>
         <p:spPr/>
         <p:txBody>
-          <a:bodyPr/>
-          <a:lstStyle/>
-          <a:p>
-            <a:endParaRPr lang="de-DE"/>
-          </a:p>
-        </p:txBody>
-      </p:sp>
-      <p:pic>
-        <p:nvPicPr>
-          <p:cNvPr id="5" name="Grafik 4">
-            <a:extLst>
-              <a:ext uri="{FF2B5EF4-FFF2-40B4-BE49-F238E27FC236}">
-                <a16:creationId xmlns:a16="http://schemas.microsoft.com/office/drawing/2014/main" id="{2D303F66-493D-17DF-7505-670DAEB578B8}"/>
-              </a:ext>
-            </a:extLst>
-          </p:cNvPr>
-          <p:cNvPicPr>
-            <a:picLocks noChangeAspect="1"/>
-          </p:cNvPicPr>
-          <p:nvPr/>
-        </p:nvPicPr>
-        <p:blipFill>
-          <a:blip r:embed="rId2"/>
-          <a:stretch>
-            <a:fillRect/>
-          </a:stretch>
-        </p:blipFill>
-        <p:spPr>
-          <a:xfrm>
-            <a:off x="3076153" y="1137918"/>
-            <a:ext cx="6039693" cy="4582164"/>
-          </a:xfrm>
-          <a:prstGeom prst="rect">
-            <a:avLst/>
-          </a:prstGeom>
-        </p:spPr>
-      </p:pic>
+          <a:bodyPr>
+            <a:normAutofit fontScale="92500"/>
+          </a:bodyPr>
+          <a:lstStyle/>
+          <a:p>
+            <a:pPr marL="514350" indent="-514350">
+              <a:buFont typeface="+mj-lt"/>
+              <a:buAutoNum type="arabicPeriod"/>
+            </a:pPr>
+            <a:r>
+              <a:rPr lang="de-DE" dirty="0"/>
+              <a:t>Recherche</a:t>
+            </a:r>
+          </a:p>
+          <a:p>
+            <a:pPr marL="971550" lvl="1" indent="-514350">
+              <a:buFont typeface="+mj-lt"/>
+              <a:buAutoNum type="arabicPeriod"/>
+            </a:pPr>
+            <a:r>
+              <a:rPr lang="de-DE" dirty="0"/>
+              <a:t>Nutzen/Aufgabe Verschattung herausarbeiten</a:t>
+            </a:r>
+          </a:p>
+          <a:p>
+            <a:pPr marL="971550" lvl="1" indent="-514350">
+              <a:buFont typeface="+mj-lt"/>
+              <a:buAutoNum type="arabicPeriod"/>
+            </a:pPr>
+            <a:r>
+              <a:rPr lang="de-DE" dirty="0"/>
+              <a:t>Normen, Richtlinien</a:t>
+            </a:r>
+          </a:p>
+          <a:p>
+            <a:pPr marL="971550" lvl="1" indent="-514350">
+              <a:buFont typeface="+mj-lt"/>
+              <a:buAutoNum type="arabicPeriod"/>
+            </a:pPr>
+            <a:r>
+              <a:rPr lang="de-DE" dirty="0"/>
+              <a:t>Mathematischer Hintergrund </a:t>
+            </a:r>
+            <a:r>
+              <a:rPr lang="de-DE" dirty="0" err="1"/>
+              <a:t>Jahresverschattung</a:t>
+            </a:r>
+            <a:r>
+              <a:rPr lang="de-DE" dirty="0"/>
+              <a:t>; wichtige Kenngrößen</a:t>
+            </a:r>
+          </a:p>
+          <a:p>
+            <a:pPr marL="514350" indent="-514350">
+              <a:buFont typeface="+mj-lt"/>
+              <a:buAutoNum type="arabicPeriod"/>
+            </a:pPr>
+            <a:r>
+              <a:rPr lang="de-DE" dirty="0"/>
+              <a:t>Existierende Software/Tools untersuchen</a:t>
+            </a:r>
+          </a:p>
+          <a:p>
+            <a:pPr marL="971550" lvl="1" indent="-514350">
+              <a:buFont typeface="+mj-lt"/>
+              <a:buAutoNum type="arabicPeriod"/>
+            </a:pPr>
+            <a:r>
+              <a:rPr lang="de-DE" dirty="0"/>
+              <a:t>Optimales Tool beschreiben; Ziele definieren</a:t>
+            </a:r>
+          </a:p>
+          <a:p>
+            <a:pPr marL="971550" lvl="1" indent="-514350">
+              <a:buFont typeface="+mj-lt"/>
+              <a:buAutoNum type="arabicPeriod"/>
+            </a:pPr>
+            <a:r>
+              <a:rPr lang="de-DE" dirty="0"/>
+              <a:t>Marktanalyse</a:t>
+            </a:r>
+          </a:p>
+          <a:p>
+            <a:pPr marL="971550" lvl="1" indent="-514350">
+              <a:buFont typeface="+mj-lt"/>
+              <a:buAutoNum type="arabicPeriod"/>
+            </a:pPr>
+            <a:r>
+              <a:rPr lang="de-DE" dirty="0"/>
+              <a:t>Vorteile/Nachteile, Herausforderungen</a:t>
+            </a:r>
+          </a:p>
+          <a:p>
+            <a:pPr marL="514350" indent="-514350">
+              <a:buFont typeface="+mj-lt"/>
+              <a:buAutoNum type="arabicPeriod"/>
+            </a:pPr>
+            <a:r>
+              <a:rPr lang="de-DE" dirty="0"/>
+              <a:t>Konzeption eigenes Tool</a:t>
+            </a:r>
+          </a:p>
+          <a:p>
+            <a:pPr marL="971550" lvl="1" indent="-514350">
+              <a:buFont typeface="+mj-lt"/>
+              <a:buAutoNum type="arabicPeriod"/>
+            </a:pPr>
+            <a:r>
+              <a:rPr lang="de-DE" dirty="0"/>
+              <a:t>Gucken wie weit man kommt?</a:t>
+            </a:r>
+          </a:p>
+          <a:p>
+            <a:pPr marL="971550" lvl="1" indent="-514350">
+              <a:buFont typeface="+mj-lt"/>
+              <a:buAutoNum type="arabicPeriod"/>
+            </a:pPr>
+            <a:r>
+              <a:rPr lang="de-DE" dirty="0"/>
+              <a:t>Pot. Probleme beim Engineering erkennen und Lösungsansätze beschreiben</a:t>
+            </a:r>
+          </a:p>
+          <a:p>
+            <a:pPr marL="971550" lvl="1" indent="-514350">
+              <a:buFont typeface="+mj-lt"/>
+              <a:buAutoNum type="arabicPeriod"/>
+            </a:pPr>
+            <a:endParaRPr lang="de-DE" dirty="0"/>
+          </a:p>
+          <a:p>
+            <a:pPr marL="971550" lvl="1" indent="-514350">
+              <a:buFont typeface="+mj-lt"/>
+              <a:buAutoNum type="arabicPeriod"/>
+            </a:pPr>
+            <a:endParaRPr lang="de-DE" dirty="0"/>
+          </a:p>
+          <a:p>
+            <a:pPr marL="971550" lvl="1" indent="-514350">
+              <a:buFont typeface="+mj-lt"/>
+              <a:buAutoNum type="arabicPeriod"/>
+            </a:pPr>
+            <a:endParaRPr lang="de-DE" dirty="0"/>
+          </a:p>
+          <a:p>
+            <a:pPr marL="971550" lvl="1" indent="-514350">
+              <a:buFont typeface="+mj-lt"/>
+              <a:buAutoNum type="arabicPeriod"/>
+            </a:pPr>
+            <a:endParaRPr lang="de-DE" dirty="0"/>
+          </a:p>
+        </p:txBody>
+      </p:sp>
     </p:spTree>
     <p:extLst>
       <p:ext uri="{BB962C8B-B14F-4D97-AF65-F5344CB8AC3E}">
-        <p14:creationId xmlns:p14="http://schemas.microsoft.com/office/powerpoint/2010/main" val="2676921187"/>
+        <p14:creationId xmlns:p14="http://schemas.microsoft.com/office/powerpoint/2010/main" val="3093920939"/>
       </p:ext>
     </p:extLst>
   </p:cSld>
@@ -3573,6 +3716,213 @@
           <p:cNvPr id="2" name="Titel 1">
             <a:extLst>
               <a:ext uri="{FF2B5EF4-FFF2-40B4-BE49-F238E27FC236}">
+                <a16:creationId xmlns:a16="http://schemas.microsoft.com/office/drawing/2014/main" id="{75C4D446-6958-59E2-4BE1-715572BFD883}"/>
+              </a:ext>
+            </a:extLst>
+          </p:cNvPr>
+          <p:cNvSpPr>
+            <a:spLocks noGrp="1"/>
+          </p:cNvSpPr>
+          <p:nvPr>
+            <p:ph type="title"/>
+          </p:nvPr>
+        </p:nvSpPr>
+        <p:spPr/>
+        <p:txBody>
+          <a:bodyPr/>
+          <a:lstStyle/>
+          <a:p>
+            <a:r>
+              <a:rPr lang="de-DE" dirty="0"/>
+              <a:t>Ziele</a:t>
+            </a:r>
+          </a:p>
+        </p:txBody>
+      </p:sp>
+      <p:sp>
+        <p:nvSpPr>
+          <p:cNvPr id="3" name="Inhaltsplatzhalter 2">
+            <a:extLst>
+              <a:ext uri="{FF2B5EF4-FFF2-40B4-BE49-F238E27FC236}">
+                <a16:creationId xmlns:a16="http://schemas.microsoft.com/office/drawing/2014/main" id="{CF6AFBC9-A695-9502-960D-F412772118AA}"/>
+              </a:ext>
+            </a:extLst>
+          </p:cNvPr>
+          <p:cNvSpPr>
+            <a:spLocks noGrp="1"/>
+          </p:cNvSpPr>
+          <p:nvPr>
+            <p:ph idx="1"/>
+          </p:nvPr>
+        </p:nvSpPr>
+        <p:spPr/>
+        <p:txBody>
+          <a:bodyPr/>
+          <a:lstStyle/>
+          <a:p>
+            <a:r>
+              <a:rPr lang="de-DE" dirty="0"/>
+              <a:t>Minimaler Engineering-Aufwand</a:t>
+            </a:r>
+          </a:p>
+          <a:p>
+            <a:r>
+              <a:rPr lang="de-DE" dirty="0"/>
+              <a:t>Open-Source </a:t>
+            </a:r>
+            <a:r>
+              <a:rPr lang="de-DE" dirty="0" err="1"/>
+              <a:t>Technologiestack</a:t>
+            </a:r>
+            <a:endParaRPr lang="de-DE" dirty="0"/>
+          </a:p>
+        </p:txBody>
+      </p:sp>
+    </p:spTree>
+    <p:extLst>
+      <p:ext uri="{BB962C8B-B14F-4D97-AF65-F5344CB8AC3E}">
+        <p14:creationId xmlns:p14="http://schemas.microsoft.com/office/powerpoint/2010/main" val="2155923060"/>
+      </p:ext>
+    </p:extLst>
+  </p:cSld>
+  <p:clrMapOvr>
+    <a:masterClrMapping/>
+  </p:clrMapOvr>
+</p:sld>
+</file>
+
+<file path=ppt/slides/slide4.xml><?xml version="1.0" encoding="utf-8"?>
+<p:sld xmlns:a="http://schemas.openxmlformats.org/drawingml/2006/main" xmlns:r="http://schemas.openxmlformats.org/officeDocument/2006/relationships" xmlns:p="http://schemas.openxmlformats.org/presentationml/2006/main">
+  <p:cSld>
+    <p:spTree>
+      <p:nvGrpSpPr>
+        <p:cNvPr id="1" name=""/>
+        <p:cNvGrpSpPr/>
+        <p:nvPr/>
+      </p:nvGrpSpPr>
+      <p:grpSpPr>
+        <a:xfrm>
+          <a:off x="0" y="0"/>
+          <a:ext cx="0" cy="0"/>
+          <a:chOff x="0" y="0"/>
+          <a:chExt cx="0" cy="0"/>
+        </a:xfrm>
+      </p:grpSpPr>
+      <p:sp>
+        <p:nvSpPr>
+          <p:cNvPr id="2" name="Titel 1">
+            <a:extLst>
+              <a:ext uri="{FF2B5EF4-FFF2-40B4-BE49-F238E27FC236}">
+                <a16:creationId xmlns:a16="http://schemas.microsoft.com/office/drawing/2014/main" id="{E5B5B2EA-BBE3-142A-D1EA-FCABF2DE8499}"/>
+              </a:ext>
+            </a:extLst>
+          </p:cNvPr>
+          <p:cNvSpPr>
+            <a:spLocks noGrp="1"/>
+          </p:cNvSpPr>
+          <p:nvPr>
+            <p:ph type="title"/>
+          </p:nvPr>
+        </p:nvSpPr>
+        <p:spPr/>
+        <p:txBody>
+          <a:bodyPr/>
+          <a:lstStyle/>
+          <a:p>
+            <a:endParaRPr lang="de-DE"/>
+          </a:p>
+        </p:txBody>
+      </p:sp>
+      <p:sp>
+        <p:nvSpPr>
+          <p:cNvPr id="3" name="Inhaltsplatzhalter 2">
+            <a:extLst>
+              <a:ext uri="{FF2B5EF4-FFF2-40B4-BE49-F238E27FC236}">
+                <a16:creationId xmlns:a16="http://schemas.microsoft.com/office/drawing/2014/main" id="{43A4864D-EC40-06B1-BFC7-2E6918226981}"/>
+              </a:ext>
+            </a:extLst>
+          </p:cNvPr>
+          <p:cNvSpPr>
+            <a:spLocks noGrp="1"/>
+          </p:cNvSpPr>
+          <p:nvPr>
+            <p:ph idx="1"/>
+          </p:nvPr>
+        </p:nvSpPr>
+        <p:spPr/>
+        <p:txBody>
+          <a:bodyPr/>
+          <a:lstStyle/>
+          <a:p>
+            <a:endParaRPr lang="de-DE" dirty="0"/>
+          </a:p>
+        </p:txBody>
+      </p:sp>
+      <p:pic>
+        <p:nvPicPr>
+          <p:cNvPr id="12" name="Grafik 11">
+            <a:extLst>
+              <a:ext uri="{FF2B5EF4-FFF2-40B4-BE49-F238E27FC236}">
+                <a16:creationId xmlns:a16="http://schemas.microsoft.com/office/drawing/2014/main" id="{1C58D894-C9A3-1076-E65E-C18E960D2917}"/>
+              </a:ext>
+            </a:extLst>
+          </p:cNvPr>
+          <p:cNvPicPr>
+            <a:picLocks noChangeAspect="1"/>
+          </p:cNvPicPr>
+          <p:nvPr/>
+        </p:nvPicPr>
+        <p:blipFill>
+          <a:blip r:embed="rId2"/>
+          <a:stretch>
+            <a:fillRect/>
+          </a:stretch>
+        </p:blipFill>
+        <p:spPr>
+          <a:xfrm>
+            <a:off x="3646170" y="1520190"/>
+            <a:ext cx="4899660" cy="3817620"/>
+          </a:xfrm>
+          <a:prstGeom prst="rect">
+            <a:avLst/>
+          </a:prstGeom>
+        </p:spPr>
+      </p:pic>
+    </p:spTree>
+    <p:extLst>
+      <p:ext uri="{BB962C8B-B14F-4D97-AF65-F5344CB8AC3E}">
+        <p14:creationId xmlns:p14="http://schemas.microsoft.com/office/powerpoint/2010/main" val="2676921187"/>
+      </p:ext>
+    </p:extLst>
+  </p:cSld>
+  <p:clrMapOvr>
+    <a:masterClrMapping/>
+  </p:clrMapOvr>
+</p:sld>
+</file>
+
+<file path=ppt/slides/slide5.xml><?xml version="1.0" encoding="utf-8"?>
+<p:sld xmlns:a="http://schemas.openxmlformats.org/drawingml/2006/main" xmlns:r="http://schemas.openxmlformats.org/officeDocument/2006/relationships" xmlns:p="http://schemas.openxmlformats.org/presentationml/2006/main">
+  <p:cSld>
+    <p:spTree>
+      <p:nvGrpSpPr>
+        <p:cNvPr id="1" name=""/>
+        <p:cNvGrpSpPr/>
+        <p:nvPr/>
+      </p:nvGrpSpPr>
+      <p:grpSpPr>
+        <a:xfrm>
+          <a:off x="0" y="0"/>
+          <a:ext cx="0" cy="0"/>
+          <a:chOff x="0" y="0"/>
+          <a:chExt cx="0" cy="0"/>
+        </a:xfrm>
+      </p:grpSpPr>
+      <p:sp>
+        <p:nvSpPr>
+          <p:cNvPr id="2" name="Titel 1">
+            <a:extLst>
+              <a:ext uri="{FF2B5EF4-FFF2-40B4-BE49-F238E27FC236}">
                 <a16:creationId xmlns:a16="http://schemas.microsoft.com/office/drawing/2014/main" id="{032FE966-25E1-3E0E-5059-F0F8ED777E68}"/>
               </a:ext>
             </a:extLst>
@@ -3595,7 +3945,7 @@
             </a:r>
             <a:r>
               <a:rPr lang="de-DE" dirty="0"/>
-              <a:t> 1 – Gebäudemodell erstellen</a:t>
+              <a:t> 1</a:t>
             </a:r>
           </a:p>
         </p:txBody>
@@ -3621,20 +3971,272 @@
           <a:bodyPr/>
           <a:lstStyle/>
           <a:p>
+            <a:r>
+              <a:rPr lang="de-DE" dirty="0"/>
+              <a:t>IFC-Datei aufbereiten</a:t>
+            </a:r>
+          </a:p>
+          <a:p>
+            <a:pPr lvl="1"/>
+            <a:r>
+              <a:rPr lang="de-DE" dirty="0"/>
+              <a:t>Dateigröße minimieren (nur Gebäudehülle behalten)</a:t>
+            </a:r>
+          </a:p>
+          <a:p>
+            <a:pPr lvl="1"/>
+            <a:r>
+              <a:rPr lang="de-DE" dirty="0"/>
+              <a:t>Teilmodelle zusammenfügen</a:t>
+            </a:r>
+          </a:p>
+          <a:p>
+            <a:r>
+              <a:rPr lang="de-DE" dirty="0"/>
+              <a:t>Datenpunkte (DP) für jedes Fenster hinterlegen</a:t>
+            </a:r>
+          </a:p>
+          <a:p>
+            <a:pPr lvl="1"/>
+            <a:r>
+              <a:rPr lang="de-DE" dirty="0"/>
+              <a:t>Listenexport aller DP über GA-Planungstool</a:t>
+            </a:r>
+          </a:p>
+          <a:p>
+            <a:pPr lvl="1"/>
+            <a:r>
+              <a:rPr lang="de-DE" dirty="0"/>
+              <a:t>Listenexport aller Fenster über Revit</a:t>
+            </a:r>
+          </a:p>
+          <a:p>
+            <a:pPr lvl="1"/>
+            <a:r>
+              <a:rPr lang="de-DE" dirty="0"/>
+              <a:t>Zuordnung DP zu Fenster (GUID) in Excel über gemeinsame Eigenschaft (z.B. Segment, Raum)</a:t>
+            </a:r>
+          </a:p>
+          <a:p>
+            <a:pPr lvl="1"/>
+            <a:r>
+              <a:rPr lang="de-DE" dirty="0"/>
+              <a:t>DP-Parameter beschreiben für jedes Fenster (Revit-Import)</a:t>
+            </a:r>
+          </a:p>
+          <a:p>
+            <a:r>
+              <a:rPr lang="de-DE" dirty="0"/>
+              <a:t>IFC in Tool importieren</a:t>
+            </a:r>
+          </a:p>
+          <a:p>
+            <a:pPr lvl="1"/>
             <a:endParaRPr lang="de-DE" dirty="0"/>
           </a:p>
           <a:p>
-            <a:r>
-              <a:rPr lang="de-DE" dirty="0"/>
-              <a:t>Weg 1: </a:t>
-            </a:r>
-          </a:p>
-        </p:txBody>
-      </p:sp>
+            <a:pPr lvl="1"/>
+            <a:endParaRPr lang="de-DE" dirty="0"/>
+          </a:p>
+          <a:p>
+            <a:endParaRPr lang="de-DE" dirty="0"/>
+          </a:p>
+        </p:txBody>
+      </p:sp>
+      <p:pic>
+        <p:nvPicPr>
+          <p:cNvPr id="9" name="Grafik 8">
+            <a:extLst>
+              <a:ext uri="{FF2B5EF4-FFF2-40B4-BE49-F238E27FC236}">
+                <a16:creationId xmlns:a16="http://schemas.microsoft.com/office/drawing/2014/main" id="{CAA39212-0860-ACF9-1A48-1983F6F1E0B5}"/>
+              </a:ext>
+            </a:extLst>
+          </p:cNvPr>
+          <p:cNvPicPr>
+            <a:picLocks noChangeAspect="1"/>
+          </p:cNvPicPr>
+          <p:nvPr/>
+        </p:nvPicPr>
+        <p:blipFill>
+          <a:blip r:embed="rId2"/>
+          <a:stretch>
+            <a:fillRect/>
+          </a:stretch>
+        </p:blipFill>
+        <p:spPr>
+          <a:xfrm>
+            <a:off x="6870633" y="241405"/>
+            <a:ext cx="4899660" cy="3817620"/>
+          </a:xfrm>
+          <a:prstGeom prst="rect">
+            <a:avLst/>
+          </a:prstGeom>
+        </p:spPr>
+      </p:pic>
     </p:spTree>
     <p:extLst>
       <p:ext uri="{BB962C8B-B14F-4D97-AF65-F5344CB8AC3E}">
         <p14:creationId xmlns:p14="http://schemas.microsoft.com/office/powerpoint/2010/main" val="42656336"/>
+      </p:ext>
+    </p:extLst>
+  </p:cSld>
+  <p:clrMapOvr>
+    <a:masterClrMapping/>
+  </p:clrMapOvr>
+</p:sld>
+</file>
+
+<file path=ppt/slides/slide6.xml><?xml version="1.0" encoding="utf-8"?>
+<p:sld xmlns:a="http://schemas.openxmlformats.org/drawingml/2006/main" xmlns:r="http://schemas.openxmlformats.org/officeDocument/2006/relationships" xmlns:p="http://schemas.openxmlformats.org/presentationml/2006/main">
+  <p:cSld>
+    <p:spTree>
+      <p:nvGrpSpPr>
+        <p:cNvPr id="1" name=""/>
+        <p:cNvGrpSpPr/>
+        <p:nvPr/>
+      </p:nvGrpSpPr>
+      <p:grpSpPr>
+        <a:xfrm>
+          <a:off x="0" y="0"/>
+          <a:ext cx="0" cy="0"/>
+          <a:chOff x="0" y="0"/>
+          <a:chExt cx="0" cy="0"/>
+        </a:xfrm>
+      </p:grpSpPr>
+      <p:sp>
+        <p:nvSpPr>
+          <p:cNvPr id="2" name="Titel 1">
+            <a:extLst>
+              <a:ext uri="{FF2B5EF4-FFF2-40B4-BE49-F238E27FC236}">
+                <a16:creationId xmlns:a16="http://schemas.microsoft.com/office/drawing/2014/main" id="{032FE966-25E1-3E0E-5059-F0F8ED777E68}"/>
+              </a:ext>
+            </a:extLst>
+          </p:cNvPr>
+          <p:cNvSpPr>
+            <a:spLocks noGrp="1"/>
+          </p:cNvSpPr>
+          <p:nvPr>
+            <p:ph type="title"/>
+          </p:nvPr>
+        </p:nvSpPr>
+        <p:spPr/>
+        <p:txBody>
+          <a:bodyPr/>
+          <a:lstStyle/>
+          <a:p>
+            <a:r>
+              <a:rPr lang="de-DE" dirty="0" err="1"/>
+              <a:t>Step</a:t>
+            </a:r>
+            <a:r>
+              <a:rPr lang="de-DE" dirty="0"/>
+              <a:t> 2</a:t>
+            </a:r>
+          </a:p>
+        </p:txBody>
+      </p:sp>
+      <p:sp>
+        <p:nvSpPr>
+          <p:cNvPr id="3" name="Inhaltsplatzhalter 2">
+            <a:extLst>
+              <a:ext uri="{FF2B5EF4-FFF2-40B4-BE49-F238E27FC236}">
+                <a16:creationId xmlns:a16="http://schemas.microsoft.com/office/drawing/2014/main" id="{83FF5CD2-8352-5A75-C704-14EF6E96AF05}"/>
+              </a:ext>
+            </a:extLst>
+          </p:cNvPr>
+          <p:cNvSpPr>
+            <a:spLocks noGrp="1"/>
+          </p:cNvSpPr>
+          <p:nvPr>
+            <p:ph idx="1"/>
+          </p:nvPr>
+        </p:nvSpPr>
+        <p:spPr/>
+        <p:txBody>
+          <a:bodyPr/>
+          <a:lstStyle/>
+          <a:p>
+            <a:pPr lvl="1"/>
+            <a:r>
+              <a:rPr lang="de-DE" dirty="0"/>
+              <a:t>Öffentliche 3D-Datensätze finden</a:t>
+            </a:r>
+          </a:p>
+          <a:p>
+            <a:pPr lvl="1"/>
+            <a:r>
+              <a:rPr lang="de-DE" dirty="0"/>
+              <a:t>Importieren in Tool</a:t>
+            </a:r>
+          </a:p>
+          <a:p>
+            <a:pPr lvl="1"/>
+            <a:r>
+              <a:rPr lang="de-DE" dirty="0"/>
+              <a:t>3D-Szene einrichten</a:t>
+            </a:r>
+          </a:p>
+          <a:p>
+            <a:pPr lvl="2"/>
+            <a:r>
+              <a:rPr lang="de-DE" dirty="0"/>
+              <a:t>Ausrichtung festlegen</a:t>
+            </a:r>
+          </a:p>
+          <a:p>
+            <a:pPr lvl="2"/>
+            <a:r>
+              <a:rPr lang="de-DE" dirty="0"/>
+              <a:t>Umgebung und Gebäude richtig zusammenfügen</a:t>
+            </a:r>
+          </a:p>
+          <a:p>
+            <a:pPr lvl="2"/>
+            <a:endParaRPr lang="de-DE" dirty="0"/>
+          </a:p>
+          <a:p>
+            <a:pPr lvl="1"/>
+            <a:endParaRPr lang="de-DE" dirty="0"/>
+          </a:p>
+          <a:p>
+            <a:endParaRPr lang="de-DE" dirty="0"/>
+          </a:p>
+        </p:txBody>
+      </p:sp>
+      <p:pic>
+        <p:nvPicPr>
+          <p:cNvPr id="9" name="Grafik 8">
+            <a:extLst>
+              <a:ext uri="{FF2B5EF4-FFF2-40B4-BE49-F238E27FC236}">
+                <a16:creationId xmlns:a16="http://schemas.microsoft.com/office/drawing/2014/main" id="{CAA39212-0860-ACF9-1A48-1983F6F1E0B5}"/>
+              </a:ext>
+            </a:extLst>
+          </p:cNvPr>
+          <p:cNvPicPr>
+            <a:picLocks noChangeAspect="1"/>
+          </p:cNvPicPr>
+          <p:nvPr/>
+        </p:nvPicPr>
+        <p:blipFill>
+          <a:blip r:embed="rId2"/>
+          <a:stretch>
+            <a:fillRect/>
+          </a:stretch>
+        </p:blipFill>
+        <p:spPr>
+          <a:xfrm>
+            <a:off x="6870633" y="241405"/>
+            <a:ext cx="4899660" cy="3817620"/>
+          </a:xfrm>
+          <a:prstGeom prst="rect">
+            <a:avLst/>
+          </a:prstGeom>
+        </p:spPr>
+      </p:pic>
+    </p:spTree>
+    <p:extLst>
+      <p:ext uri="{BB962C8B-B14F-4D97-AF65-F5344CB8AC3E}">
+        <p14:creationId xmlns:p14="http://schemas.microsoft.com/office/powerpoint/2010/main" val="3718802317"/>
       </p:ext>
     </p:extLst>
   </p:cSld>

</xml_diff>

<commit_message>
Kleines update zu PowerPoint
</commit_message>
<xml_diff>
--- a/Roadmap Masterarbeit.pptx
+++ b/Roadmap Masterarbeit.pptx
@@ -7,10 +7,10 @@
   <p:sldIdLst>
     <p:sldId id="256" r:id="rId2"/>
     <p:sldId id="259" r:id="rId3"/>
-    <p:sldId id="262" r:id="rId4"/>
-    <p:sldId id="257" r:id="rId5"/>
-    <p:sldId id="258" r:id="rId6"/>
-    <p:sldId id="261" r:id="rId7"/>
+    <p:sldId id="257" r:id="rId4"/>
+    <p:sldId id="258" r:id="rId5"/>
+    <p:sldId id="261" r:id="rId6"/>
+    <p:sldId id="262" r:id="rId7"/>
   </p:sldIdLst>
   <p:sldSz cx="12192000" cy="6858000"/>
   <p:notesSz cx="6858000" cy="9144000"/>
@@ -120,10 +120,10 @@
         <p14:section name="Abschnitt ohne Titel" id="{7EBD3A8B-FF3E-4EB6-AC27-9F8637707A5D}">
           <p14:sldIdLst>
             <p14:sldId id="259"/>
-            <p14:sldId id="262"/>
             <p14:sldId id="257"/>
             <p14:sldId id="258"/>
             <p14:sldId id="261"/>
+            <p14:sldId id="262"/>
           </p14:sldIdLst>
         </p14:section>
       </p14:sectionLst>
@@ -282,7 +282,7 @@
           <a:p>
             <a:fld id="{DAF72321-0ADC-40FD-88D2-B46DBDBC0FBC}" type="datetimeFigureOut">
               <a:rPr lang="de-DE" smtClean="0"/>
-              <a:t>02.09.2025</a:t>
+              <a:t>03.09.2025</a:t>
             </a:fld>
             <a:endParaRPr lang="de-DE"/>
           </a:p>
@@ -480,7 +480,7 @@
           <a:p>
             <a:fld id="{DAF72321-0ADC-40FD-88D2-B46DBDBC0FBC}" type="datetimeFigureOut">
               <a:rPr lang="de-DE" smtClean="0"/>
-              <a:t>02.09.2025</a:t>
+              <a:t>03.09.2025</a:t>
             </a:fld>
             <a:endParaRPr lang="de-DE"/>
           </a:p>
@@ -688,7 +688,7 @@
           <a:p>
             <a:fld id="{DAF72321-0ADC-40FD-88D2-B46DBDBC0FBC}" type="datetimeFigureOut">
               <a:rPr lang="de-DE" smtClean="0"/>
-              <a:t>02.09.2025</a:t>
+              <a:t>03.09.2025</a:t>
             </a:fld>
             <a:endParaRPr lang="de-DE"/>
           </a:p>
@@ -886,7 +886,7 @@
           <a:p>
             <a:fld id="{DAF72321-0ADC-40FD-88D2-B46DBDBC0FBC}" type="datetimeFigureOut">
               <a:rPr lang="de-DE" smtClean="0"/>
-              <a:t>02.09.2025</a:t>
+              <a:t>03.09.2025</a:t>
             </a:fld>
             <a:endParaRPr lang="de-DE"/>
           </a:p>
@@ -1161,7 +1161,7 @@
           <a:p>
             <a:fld id="{DAF72321-0ADC-40FD-88D2-B46DBDBC0FBC}" type="datetimeFigureOut">
               <a:rPr lang="de-DE" smtClean="0"/>
-              <a:t>02.09.2025</a:t>
+              <a:t>03.09.2025</a:t>
             </a:fld>
             <a:endParaRPr lang="de-DE"/>
           </a:p>
@@ -1426,7 +1426,7 @@
           <a:p>
             <a:fld id="{DAF72321-0ADC-40FD-88D2-B46DBDBC0FBC}" type="datetimeFigureOut">
               <a:rPr lang="de-DE" smtClean="0"/>
-              <a:t>02.09.2025</a:t>
+              <a:t>03.09.2025</a:t>
             </a:fld>
             <a:endParaRPr lang="de-DE"/>
           </a:p>
@@ -1838,7 +1838,7 @@
           <a:p>
             <a:fld id="{DAF72321-0ADC-40FD-88D2-B46DBDBC0FBC}" type="datetimeFigureOut">
               <a:rPr lang="de-DE" smtClean="0"/>
-              <a:t>02.09.2025</a:t>
+              <a:t>03.09.2025</a:t>
             </a:fld>
             <a:endParaRPr lang="de-DE"/>
           </a:p>
@@ -1979,7 +1979,7 @@
           <a:p>
             <a:fld id="{DAF72321-0ADC-40FD-88D2-B46DBDBC0FBC}" type="datetimeFigureOut">
               <a:rPr lang="de-DE" smtClean="0"/>
-              <a:t>02.09.2025</a:t>
+              <a:t>03.09.2025</a:t>
             </a:fld>
             <a:endParaRPr lang="de-DE"/>
           </a:p>
@@ -2092,7 +2092,7 @@
           <a:p>
             <a:fld id="{DAF72321-0ADC-40FD-88D2-B46DBDBC0FBC}" type="datetimeFigureOut">
               <a:rPr lang="de-DE" smtClean="0"/>
-              <a:t>02.09.2025</a:t>
+              <a:t>03.09.2025</a:t>
             </a:fld>
             <a:endParaRPr lang="de-DE"/>
           </a:p>
@@ -2403,7 +2403,7 @@
           <a:p>
             <a:fld id="{DAF72321-0ADC-40FD-88D2-B46DBDBC0FBC}" type="datetimeFigureOut">
               <a:rPr lang="de-DE" smtClean="0"/>
-              <a:t>02.09.2025</a:t>
+              <a:t>03.09.2025</a:t>
             </a:fld>
             <a:endParaRPr lang="de-DE"/>
           </a:p>
@@ -2691,7 +2691,7 @@
           <a:p>
             <a:fld id="{DAF72321-0ADC-40FD-88D2-B46DBDBC0FBC}" type="datetimeFigureOut">
               <a:rPr lang="de-DE" smtClean="0"/>
-              <a:t>02.09.2025</a:t>
+              <a:t>03.09.2025</a:t>
             </a:fld>
             <a:endParaRPr lang="de-DE"/>
           </a:p>
@@ -2932,7 +2932,7 @@
           <a:p>
             <a:fld id="{DAF72321-0ADC-40FD-88D2-B46DBDBC0FBC}" type="datetimeFigureOut">
               <a:rPr lang="de-DE" smtClean="0"/>
-              <a:t>02.09.2025</a:t>
+              <a:t>03.09.2025</a:t>
             </a:fld>
             <a:endParaRPr lang="de-DE"/>
           </a:p>
@@ -3638,7 +3638,7 @@
             </a:pPr>
             <a:r>
               <a:rPr lang="de-DE" dirty="0"/>
-              <a:t>Gucken wie weit man kommt?</a:t>
+              <a:t>Testen wie weit man kommt?</a:t>
             </a:r>
           </a:p>
           <a:p>
@@ -3695,103 +3695,6 @@
 </file>
 
 <file path=ppt/slides/slide3.xml><?xml version="1.0" encoding="utf-8"?>
-<p:sld xmlns:a="http://schemas.openxmlformats.org/drawingml/2006/main" xmlns:r="http://schemas.openxmlformats.org/officeDocument/2006/relationships" xmlns:p="http://schemas.openxmlformats.org/presentationml/2006/main">
-  <p:cSld>
-    <p:spTree>
-      <p:nvGrpSpPr>
-        <p:cNvPr id="1" name=""/>
-        <p:cNvGrpSpPr/>
-        <p:nvPr/>
-      </p:nvGrpSpPr>
-      <p:grpSpPr>
-        <a:xfrm>
-          <a:off x="0" y="0"/>
-          <a:ext cx="0" cy="0"/>
-          <a:chOff x="0" y="0"/>
-          <a:chExt cx="0" cy="0"/>
-        </a:xfrm>
-      </p:grpSpPr>
-      <p:sp>
-        <p:nvSpPr>
-          <p:cNvPr id="2" name="Titel 1">
-            <a:extLst>
-              <a:ext uri="{FF2B5EF4-FFF2-40B4-BE49-F238E27FC236}">
-                <a16:creationId xmlns:a16="http://schemas.microsoft.com/office/drawing/2014/main" id="{75C4D446-6958-59E2-4BE1-715572BFD883}"/>
-              </a:ext>
-            </a:extLst>
-          </p:cNvPr>
-          <p:cNvSpPr>
-            <a:spLocks noGrp="1"/>
-          </p:cNvSpPr>
-          <p:nvPr>
-            <p:ph type="title"/>
-          </p:nvPr>
-        </p:nvSpPr>
-        <p:spPr/>
-        <p:txBody>
-          <a:bodyPr/>
-          <a:lstStyle/>
-          <a:p>
-            <a:r>
-              <a:rPr lang="de-DE" dirty="0"/>
-              <a:t>Ziele</a:t>
-            </a:r>
-          </a:p>
-        </p:txBody>
-      </p:sp>
-      <p:sp>
-        <p:nvSpPr>
-          <p:cNvPr id="3" name="Inhaltsplatzhalter 2">
-            <a:extLst>
-              <a:ext uri="{FF2B5EF4-FFF2-40B4-BE49-F238E27FC236}">
-                <a16:creationId xmlns:a16="http://schemas.microsoft.com/office/drawing/2014/main" id="{CF6AFBC9-A695-9502-960D-F412772118AA}"/>
-              </a:ext>
-            </a:extLst>
-          </p:cNvPr>
-          <p:cNvSpPr>
-            <a:spLocks noGrp="1"/>
-          </p:cNvSpPr>
-          <p:nvPr>
-            <p:ph idx="1"/>
-          </p:nvPr>
-        </p:nvSpPr>
-        <p:spPr/>
-        <p:txBody>
-          <a:bodyPr/>
-          <a:lstStyle/>
-          <a:p>
-            <a:r>
-              <a:rPr lang="de-DE" dirty="0"/>
-              <a:t>Minimaler Engineering-Aufwand</a:t>
-            </a:r>
-          </a:p>
-          <a:p>
-            <a:r>
-              <a:rPr lang="de-DE" dirty="0"/>
-              <a:t>Open-Source </a:t>
-            </a:r>
-            <a:r>
-              <a:rPr lang="de-DE" dirty="0" err="1"/>
-              <a:t>Technologiestack</a:t>
-            </a:r>
-            <a:endParaRPr lang="de-DE" dirty="0"/>
-          </a:p>
-        </p:txBody>
-      </p:sp>
-    </p:spTree>
-    <p:extLst>
-      <p:ext uri="{BB962C8B-B14F-4D97-AF65-F5344CB8AC3E}">
-        <p14:creationId xmlns:p14="http://schemas.microsoft.com/office/powerpoint/2010/main" val="2155923060"/>
-      </p:ext>
-    </p:extLst>
-  </p:cSld>
-  <p:clrMapOvr>
-    <a:masterClrMapping/>
-  </p:clrMapOvr>
-</p:sld>
-</file>
-
-<file path=ppt/slides/slide4.xml><?xml version="1.0" encoding="utf-8"?>
 <p:sld xmlns:a="http://schemas.openxmlformats.org/drawingml/2006/main" xmlns:r="http://schemas.openxmlformats.org/officeDocument/2006/relationships" xmlns:p="http://schemas.openxmlformats.org/presentationml/2006/main">
   <p:cSld>
     <p:spTree>
@@ -3901,7 +3804,7 @@
 </p:sld>
 </file>
 
-<file path=ppt/slides/slide5.xml><?xml version="1.0" encoding="utf-8"?>
+<file path=ppt/slides/slide4.xml><?xml version="1.0" encoding="utf-8"?>
 <p:sld xmlns:a="http://schemas.openxmlformats.org/drawingml/2006/main" xmlns:r="http://schemas.openxmlformats.org/officeDocument/2006/relationships" xmlns:p="http://schemas.openxmlformats.org/presentationml/2006/main">
   <p:cSld>
     <p:spTree>
@@ -4086,7 +3989,7 @@
 </p:sld>
 </file>
 
-<file path=ppt/slides/slide6.xml><?xml version="1.0" encoding="utf-8"?>
+<file path=ppt/slides/slide5.xml><?xml version="1.0" encoding="utf-8"?>
 <p:sld xmlns:a="http://schemas.openxmlformats.org/drawingml/2006/main" xmlns:r="http://schemas.openxmlformats.org/officeDocument/2006/relationships" xmlns:p="http://schemas.openxmlformats.org/presentationml/2006/main">
   <p:cSld>
     <p:spTree>
@@ -4237,6 +4140,103 @@
     <p:extLst>
       <p:ext uri="{BB962C8B-B14F-4D97-AF65-F5344CB8AC3E}">
         <p14:creationId xmlns:p14="http://schemas.microsoft.com/office/powerpoint/2010/main" val="3718802317"/>
+      </p:ext>
+    </p:extLst>
+  </p:cSld>
+  <p:clrMapOvr>
+    <a:masterClrMapping/>
+  </p:clrMapOvr>
+</p:sld>
+</file>
+
+<file path=ppt/slides/slide6.xml><?xml version="1.0" encoding="utf-8"?>
+<p:sld xmlns:a="http://schemas.openxmlformats.org/drawingml/2006/main" xmlns:r="http://schemas.openxmlformats.org/officeDocument/2006/relationships" xmlns:p="http://schemas.openxmlformats.org/presentationml/2006/main" show="0">
+  <p:cSld>
+    <p:spTree>
+      <p:nvGrpSpPr>
+        <p:cNvPr id="1" name=""/>
+        <p:cNvGrpSpPr/>
+        <p:nvPr/>
+      </p:nvGrpSpPr>
+      <p:grpSpPr>
+        <a:xfrm>
+          <a:off x="0" y="0"/>
+          <a:ext cx="0" cy="0"/>
+          <a:chOff x="0" y="0"/>
+          <a:chExt cx="0" cy="0"/>
+        </a:xfrm>
+      </p:grpSpPr>
+      <p:sp>
+        <p:nvSpPr>
+          <p:cNvPr id="2" name="Titel 1">
+            <a:extLst>
+              <a:ext uri="{FF2B5EF4-FFF2-40B4-BE49-F238E27FC236}">
+                <a16:creationId xmlns:a16="http://schemas.microsoft.com/office/drawing/2014/main" id="{75C4D446-6958-59E2-4BE1-715572BFD883}"/>
+              </a:ext>
+            </a:extLst>
+          </p:cNvPr>
+          <p:cNvSpPr>
+            <a:spLocks noGrp="1"/>
+          </p:cNvSpPr>
+          <p:nvPr>
+            <p:ph type="title"/>
+          </p:nvPr>
+        </p:nvSpPr>
+        <p:spPr/>
+        <p:txBody>
+          <a:bodyPr/>
+          <a:lstStyle/>
+          <a:p>
+            <a:r>
+              <a:rPr lang="de-DE" dirty="0"/>
+              <a:t>Ziele</a:t>
+            </a:r>
+          </a:p>
+        </p:txBody>
+      </p:sp>
+      <p:sp>
+        <p:nvSpPr>
+          <p:cNvPr id="3" name="Inhaltsplatzhalter 2">
+            <a:extLst>
+              <a:ext uri="{FF2B5EF4-FFF2-40B4-BE49-F238E27FC236}">
+                <a16:creationId xmlns:a16="http://schemas.microsoft.com/office/drawing/2014/main" id="{CF6AFBC9-A695-9502-960D-F412772118AA}"/>
+              </a:ext>
+            </a:extLst>
+          </p:cNvPr>
+          <p:cNvSpPr>
+            <a:spLocks noGrp="1"/>
+          </p:cNvSpPr>
+          <p:nvPr>
+            <p:ph idx="1"/>
+          </p:nvPr>
+        </p:nvSpPr>
+        <p:spPr/>
+        <p:txBody>
+          <a:bodyPr/>
+          <a:lstStyle/>
+          <a:p>
+            <a:r>
+              <a:rPr lang="de-DE" dirty="0"/>
+              <a:t>Minimaler Engineering-Aufwand</a:t>
+            </a:r>
+          </a:p>
+          <a:p>
+            <a:r>
+              <a:rPr lang="de-DE" dirty="0"/>
+              <a:t>Open-Source </a:t>
+            </a:r>
+            <a:r>
+              <a:rPr lang="de-DE" dirty="0" err="1"/>
+              <a:t>Technologiestack</a:t>
+            </a:r>
+            <a:endParaRPr lang="de-DE" dirty="0"/>
+          </a:p>
+        </p:txBody>
+      </p:sp>
+    </p:spTree>
+    <p:extLst>
+      <p:ext uri="{BB962C8B-B14F-4D97-AF65-F5344CB8AC3E}">
+        <p14:creationId xmlns:p14="http://schemas.microsoft.com/office/powerpoint/2010/main" val="2155923060"/>
       </p:ext>
     </p:extLst>
   </p:cSld>

</xml_diff>